<commit_message>
Minor changes to D1 materials, adding D2 materials.
</commit_message>
<xml_diff>
--- a/Day 1 Part 3/D1P3.pptx
+++ b/Day 1 Part 3/D1P3.pptx
@@ -262,52 +262,15 @@
 </p188:authorLst>
 </file>
 
-<file path=ppt/revisionInfo.xml><?xml version="1.0" encoding="utf-8"?>
-<p1510:revInfo xmlns:a="http://schemas.openxmlformats.org/drawingml/2006/main" xmlns:r="http://schemas.openxmlformats.org/officeDocument/2006/relationships" xmlns:p1510="http://schemas.microsoft.com/office/powerpoint/2015/10/main">
-  <p1510:revLst>
-    <p1510:client id="{176D4094-5553-473F-806F-2EDE7C368238}" v="1" dt="2026-01-08T10:27:18.262"/>
-    <p1510:client id="{7BED3835-1716-42B5-B023-6A2990DCB316}" v="45" dt="2026-01-09T02:03:32.961"/>
-  </p1510:revLst>
-</p1510:revInfo>
-</file>
-
 <file path=ppt/changesInfos/changesInfo1.xml><?xml version="1.0" encoding="utf-8"?>
 <pc:chgInfo xmlns:a="http://schemas.openxmlformats.org/drawingml/2006/main" xmlns:r="http://schemas.openxmlformats.org/officeDocument/2006/relationships" xmlns:ac="http://schemas.microsoft.com/office/drawing/2013/main/command" xmlns:pc="http://schemas.microsoft.com/office/powerpoint/2013/main/command">
   <pc:docChgLst>
     <pc:chgData name="Matthieu De Mari" userId="dfb708c9-d8dc-439f-9a3b-c772bf4a311c" providerId="ADAL" clId="{81E9B007-0C2C-493E-9B93-55A62C9C1F12}"/>
     <pc:docChg chg="custSel addSld delSld modSld sldOrd delSection modSection">
-      <pc:chgData name="Matthieu De Mari" userId="dfb708c9-d8dc-439f-9a3b-c772bf4a311c" providerId="ADAL" clId="{81E9B007-0C2C-493E-9B93-55A62C9C1F12}" dt="2026-01-09T02:05:13.241" v="664" actId="47"/>
+      <pc:chgData name="Matthieu De Mari" userId="dfb708c9-d8dc-439f-9a3b-c772bf4a311c" providerId="ADAL" clId="{81E9B007-0C2C-493E-9B93-55A62C9C1F12}" dt="2026-01-12T06:25:18.942" v="665" actId="20577"/>
       <pc:docMkLst>
         <pc:docMk/>
       </pc:docMkLst>
-      <pc:sldChg chg="del">
-        <pc:chgData name="Matthieu De Mari" userId="dfb708c9-d8dc-439f-9a3b-c772bf4a311c" providerId="ADAL" clId="{81E9B007-0C2C-493E-9B93-55A62C9C1F12}" dt="2026-01-09T01:53:00.960" v="451" actId="47"/>
-        <pc:sldMkLst>
-          <pc:docMk/>
-          <pc:sldMk cId="3442501962" sldId="257"/>
-        </pc:sldMkLst>
-      </pc:sldChg>
-      <pc:sldChg chg="del">
-        <pc:chgData name="Matthieu De Mari" userId="dfb708c9-d8dc-439f-9a3b-c772bf4a311c" providerId="ADAL" clId="{81E9B007-0C2C-493E-9B93-55A62C9C1F12}" dt="2026-01-09T02:05:13.241" v="664" actId="47"/>
-        <pc:sldMkLst>
-          <pc:docMk/>
-          <pc:sldMk cId="1893873068" sldId="266"/>
-        </pc:sldMkLst>
-      </pc:sldChg>
-      <pc:sldChg chg="del">
-        <pc:chgData name="Matthieu De Mari" userId="dfb708c9-d8dc-439f-9a3b-c772bf4a311c" providerId="ADAL" clId="{81E9B007-0C2C-493E-9B93-55A62C9C1F12}" dt="2026-01-09T02:05:13.241" v="664" actId="47"/>
-        <pc:sldMkLst>
-          <pc:docMk/>
-          <pc:sldMk cId="3880949074" sldId="267"/>
-        </pc:sldMkLst>
-      </pc:sldChg>
-      <pc:sldChg chg="del">
-        <pc:chgData name="Matthieu De Mari" userId="dfb708c9-d8dc-439f-9a3b-c772bf4a311c" providerId="ADAL" clId="{81E9B007-0C2C-493E-9B93-55A62C9C1F12}" dt="2026-01-09T02:05:10.959" v="663" actId="47"/>
-        <pc:sldMkLst>
-          <pc:docMk/>
-          <pc:sldMk cId="1036081419" sldId="346"/>
-        </pc:sldMkLst>
-      </pc:sldChg>
       <pc:sldChg chg="modSp mod">
         <pc:chgData name="Matthieu De Mari" userId="dfb708c9-d8dc-439f-9a3b-c772bf4a311c" providerId="ADAL" clId="{81E9B007-0C2C-493E-9B93-55A62C9C1F12}" dt="2026-01-09T01:52:54.210" v="450" actId="20577"/>
         <pc:sldMkLst>
@@ -342,21 +305,6 @@
           <ac:spMkLst>
             <pc:docMk/>
             <pc:sldMk cId="1464669599" sldId="517"/>
-            <ac:spMk id="3" creationId="{35995840-A9D9-479A-A34F-EA7DC229D38E}"/>
-          </ac:spMkLst>
-        </pc:spChg>
-      </pc:sldChg>
-      <pc:sldChg chg="modSp del mod">
-        <pc:chgData name="Matthieu De Mari" userId="dfb708c9-d8dc-439f-9a3b-c772bf4a311c" providerId="ADAL" clId="{81E9B007-0C2C-493E-9B93-55A62C9C1F12}" dt="2026-01-09T01:53:17.421" v="457" actId="47"/>
-        <pc:sldMkLst>
-          <pc:docMk/>
-          <pc:sldMk cId="3190584464" sldId="518"/>
-        </pc:sldMkLst>
-        <pc:spChg chg="mod">
-          <ac:chgData name="Matthieu De Mari" userId="dfb708c9-d8dc-439f-9a3b-c772bf4a311c" providerId="ADAL" clId="{81E9B007-0C2C-493E-9B93-55A62C9C1F12}" dt="2026-01-09T01:53:08.102" v="453" actId="21"/>
-          <ac:spMkLst>
-            <pc:docMk/>
-            <pc:sldMk cId="3190584464" sldId="518"/>
             <ac:spMk id="3" creationId="{35995840-A9D9-479A-A34F-EA7DC229D38E}"/>
           </ac:spMkLst>
         </pc:spChg>
@@ -611,185 +559,6 @@
           </ac:cxnSpMkLst>
         </pc:cxnChg>
       </pc:sldChg>
-      <pc:sldChg chg="del">
-        <pc:chgData name="Matthieu De Mari" userId="dfb708c9-d8dc-439f-9a3b-c772bf4a311c" providerId="ADAL" clId="{81E9B007-0C2C-493E-9B93-55A62C9C1F12}" dt="2026-01-09T02:04:59.043" v="659" actId="47"/>
-        <pc:sldMkLst>
-          <pc:docMk/>
-          <pc:sldMk cId="2118947663" sldId="567"/>
-        </pc:sldMkLst>
-      </pc:sldChg>
-      <pc:sldChg chg="del">
-        <pc:chgData name="Matthieu De Mari" userId="dfb708c9-d8dc-439f-9a3b-c772bf4a311c" providerId="ADAL" clId="{81E9B007-0C2C-493E-9B93-55A62C9C1F12}" dt="2026-01-09T02:04:59.043" v="659" actId="47"/>
-        <pc:sldMkLst>
-          <pc:docMk/>
-          <pc:sldMk cId="209871370" sldId="568"/>
-        </pc:sldMkLst>
-      </pc:sldChg>
-      <pc:sldChg chg="modSp del mod">
-        <pc:chgData name="Matthieu De Mari" userId="dfb708c9-d8dc-439f-9a3b-c772bf4a311c" providerId="ADAL" clId="{81E9B007-0C2C-493E-9B93-55A62C9C1F12}" dt="2026-01-09T02:05:13.241" v="664" actId="47"/>
-        <pc:sldMkLst>
-          <pc:docMk/>
-          <pc:sldMk cId="548617228" sldId="570"/>
-        </pc:sldMkLst>
-        <pc:spChg chg="mod">
-          <ac:chgData name="Matthieu De Mari" userId="dfb708c9-d8dc-439f-9a3b-c772bf4a311c" providerId="ADAL" clId="{81E9B007-0C2C-493E-9B93-55A62C9C1F12}" dt="2025-12-18T21:50:16.109" v="445" actId="20577"/>
-          <ac:spMkLst>
-            <pc:docMk/>
-            <pc:sldMk cId="548617228" sldId="570"/>
-            <ac:spMk id="3" creationId="{E475B357-0886-EDDA-5F55-77F580FB4D9B}"/>
-          </ac:spMkLst>
-        </pc:spChg>
-      </pc:sldChg>
-      <pc:sldChg chg="del">
-        <pc:chgData name="Matthieu De Mari" userId="dfb708c9-d8dc-439f-9a3b-c772bf4a311c" providerId="ADAL" clId="{81E9B007-0C2C-493E-9B93-55A62C9C1F12}" dt="2026-01-09T02:05:13.241" v="664" actId="47"/>
-        <pc:sldMkLst>
-          <pc:docMk/>
-          <pc:sldMk cId="353688173" sldId="571"/>
-        </pc:sldMkLst>
-      </pc:sldChg>
-      <pc:sldChg chg="del">
-        <pc:chgData name="Matthieu De Mari" userId="dfb708c9-d8dc-439f-9a3b-c772bf4a311c" providerId="ADAL" clId="{81E9B007-0C2C-493E-9B93-55A62C9C1F12}" dt="2026-01-09T02:05:00.869" v="660" actId="47"/>
-        <pc:sldMkLst>
-          <pc:docMk/>
-          <pc:sldMk cId="757709305" sldId="572"/>
-        </pc:sldMkLst>
-      </pc:sldChg>
-      <pc:sldChg chg="del">
-        <pc:chgData name="Matthieu De Mari" userId="dfb708c9-d8dc-439f-9a3b-c772bf4a311c" providerId="ADAL" clId="{81E9B007-0C2C-493E-9B93-55A62C9C1F12}" dt="2026-01-09T02:05:00.869" v="660" actId="47"/>
-        <pc:sldMkLst>
-          <pc:docMk/>
-          <pc:sldMk cId="3960741178" sldId="573"/>
-        </pc:sldMkLst>
-      </pc:sldChg>
-      <pc:sldChg chg="del">
-        <pc:chgData name="Matthieu De Mari" userId="dfb708c9-d8dc-439f-9a3b-c772bf4a311c" providerId="ADAL" clId="{81E9B007-0C2C-493E-9B93-55A62C9C1F12}" dt="2026-01-09T02:05:00.869" v="660" actId="47"/>
-        <pc:sldMkLst>
-          <pc:docMk/>
-          <pc:sldMk cId="2111657733" sldId="574"/>
-        </pc:sldMkLst>
-      </pc:sldChg>
-      <pc:sldChg chg="del">
-        <pc:chgData name="Matthieu De Mari" userId="dfb708c9-d8dc-439f-9a3b-c772bf4a311c" providerId="ADAL" clId="{81E9B007-0C2C-493E-9B93-55A62C9C1F12}" dt="2026-01-09T02:05:00.869" v="660" actId="47"/>
-        <pc:sldMkLst>
-          <pc:docMk/>
-          <pc:sldMk cId="2674170786" sldId="575"/>
-        </pc:sldMkLst>
-      </pc:sldChg>
-      <pc:sldChg chg="del">
-        <pc:chgData name="Matthieu De Mari" userId="dfb708c9-d8dc-439f-9a3b-c772bf4a311c" providerId="ADAL" clId="{81E9B007-0C2C-493E-9B93-55A62C9C1F12}" dt="2026-01-09T02:05:00.869" v="660" actId="47"/>
-        <pc:sldMkLst>
-          <pc:docMk/>
-          <pc:sldMk cId="4180016153" sldId="576"/>
-        </pc:sldMkLst>
-      </pc:sldChg>
-      <pc:sldChg chg="del">
-        <pc:chgData name="Matthieu De Mari" userId="dfb708c9-d8dc-439f-9a3b-c772bf4a311c" providerId="ADAL" clId="{81E9B007-0C2C-493E-9B93-55A62C9C1F12}" dt="2026-01-09T02:05:02.356" v="661" actId="47"/>
-        <pc:sldMkLst>
-          <pc:docMk/>
-          <pc:sldMk cId="1620224169" sldId="577"/>
-        </pc:sldMkLst>
-      </pc:sldChg>
-      <pc:sldChg chg="modSp del">
-        <pc:chgData name="Matthieu De Mari" userId="dfb708c9-d8dc-439f-9a3b-c772bf4a311c" providerId="ADAL" clId="{81E9B007-0C2C-493E-9B93-55A62C9C1F12}" dt="2026-01-09T02:05:03.644" v="662" actId="47"/>
-        <pc:sldMkLst>
-          <pc:docMk/>
-          <pc:sldMk cId="174187107" sldId="578"/>
-        </pc:sldMkLst>
-        <pc:spChg chg="mod">
-          <ac:chgData name="Matthieu De Mari" userId="dfb708c9-d8dc-439f-9a3b-c772bf4a311c" providerId="ADAL" clId="{81E9B007-0C2C-493E-9B93-55A62C9C1F12}" dt="2026-01-08T10:27:18.262" v="446" actId="20577"/>
-          <ac:spMkLst>
-            <pc:docMk/>
-            <pc:sldMk cId="174187107" sldId="578"/>
-            <ac:spMk id="16" creationId="{5CF0157F-6568-59C9-9C76-67042E94E139}"/>
-          </ac:spMkLst>
-        </pc:spChg>
-      </pc:sldChg>
-      <pc:sldChg chg="del">
-        <pc:chgData name="Matthieu De Mari" userId="dfb708c9-d8dc-439f-9a3b-c772bf4a311c" providerId="ADAL" clId="{81E9B007-0C2C-493E-9B93-55A62C9C1F12}" dt="2026-01-09T02:05:02.356" v="661" actId="47"/>
-        <pc:sldMkLst>
-          <pc:docMk/>
-          <pc:sldMk cId="3045576156" sldId="579"/>
-        </pc:sldMkLst>
-      </pc:sldChg>
-      <pc:sldChg chg="modSp del mod">
-        <pc:chgData name="Matthieu De Mari" userId="dfb708c9-d8dc-439f-9a3b-c772bf4a311c" providerId="ADAL" clId="{81E9B007-0C2C-493E-9B93-55A62C9C1F12}" dt="2026-01-09T02:05:02.356" v="661" actId="47"/>
-        <pc:sldMkLst>
-          <pc:docMk/>
-          <pc:sldMk cId="4030169117" sldId="580"/>
-        </pc:sldMkLst>
-        <pc:spChg chg="mod">
-          <ac:chgData name="Matthieu De Mari" userId="dfb708c9-d8dc-439f-9a3b-c772bf4a311c" providerId="ADAL" clId="{81E9B007-0C2C-493E-9B93-55A62C9C1F12}" dt="2025-12-18T21:45:04.116" v="331" actId="20577"/>
-          <ac:spMkLst>
-            <pc:docMk/>
-            <pc:sldMk cId="4030169117" sldId="580"/>
-            <ac:spMk id="8" creationId="{56F73953-A2CE-A62E-D071-2A65983D9173}"/>
-          </ac:spMkLst>
-        </pc:spChg>
-      </pc:sldChg>
-      <pc:sldChg chg="del">
-        <pc:chgData name="Matthieu De Mari" userId="dfb708c9-d8dc-439f-9a3b-c772bf4a311c" providerId="ADAL" clId="{81E9B007-0C2C-493E-9B93-55A62C9C1F12}" dt="2026-01-09T02:05:03.644" v="662" actId="47"/>
-        <pc:sldMkLst>
-          <pc:docMk/>
-          <pc:sldMk cId="2134879360" sldId="581"/>
-        </pc:sldMkLst>
-      </pc:sldChg>
-      <pc:sldChg chg="modSp del mod">
-        <pc:chgData name="Matthieu De Mari" userId="dfb708c9-d8dc-439f-9a3b-c772bf4a311c" providerId="ADAL" clId="{81E9B007-0C2C-493E-9B93-55A62C9C1F12}" dt="2026-01-09T02:05:03.644" v="662" actId="47"/>
-        <pc:sldMkLst>
-          <pc:docMk/>
-          <pc:sldMk cId="1162878205" sldId="582"/>
-        </pc:sldMkLst>
-        <pc:spChg chg="mod">
-          <ac:chgData name="Matthieu De Mari" userId="dfb708c9-d8dc-439f-9a3b-c772bf4a311c" providerId="ADAL" clId="{81E9B007-0C2C-493E-9B93-55A62C9C1F12}" dt="2025-12-18T21:46:10.439" v="402" actId="20577"/>
-          <ac:spMkLst>
-            <pc:docMk/>
-            <pc:sldMk cId="1162878205" sldId="582"/>
-            <ac:spMk id="4" creationId="{720BC5D3-5690-1CC7-4476-5F4D434E7343}"/>
-          </ac:spMkLst>
-        </pc:spChg>
-      </pc:sldChg>
-      <pc:sldChg chg="del">
-        <pc:chgData name="Matthieu De Mari" userId="dfb708c9-d8dc-439f-9a3b-c772bf4a311c" providerId="ADAL" clId="{81E9B007-0C2C-493E-9B93-55A62C9C1F12}" dt="2026-01-09T02:05:03.644" v="662" actId="47"/>
-        <pc:sldMkLst>
-          <pc:docMk/>
-          <pc:sldMk cId="2761289253" sldId="583"/>
-        </pc:sldMkLst>
-      </pc:sldChg>
-      <pc:sldChg chg="del">
-        <pc:chgData name="Matthieu De Mari" userId="dfb708c9-d8dc-439f-9a3b-c772bf4a311c" providerId="ADAL" clId="{81E9B007-0C2C-493E-9B93-55A62C9C1F12}" dt="2026-01-09T02:05:10.959" v="663" actId="47"/>
-        <pc:sldMkLst>
-          <pc:docMk/>
-          <pc:sldMk cId="4234745274" sldId="584"/>
-        </pc:sldMkLst>
-      </pc:sldChg>
-      <pc:sldChg chg="del">
-        <pc:chgData name="Matthieu De Mari" userId="dfb708c9-d8dc-439f-9a3b-c772bf4a311c" providerId="ADAL" clId="{81E9B007-0C2C-493E-9B93-55A62C9C1F12}" dt="2026-01-09T02:05:02.356" v="661" actId="47"/>
-        <pc:sldMkLst>
-          <pc:docMk/>
-          <pc:sldMk cId="1730252268" sldId="585"/>
-        </pc:sldMkLst>
-      </pc:sldChg>
-      <pc:sldChg chg="del">
-        <pc:chgData name="Matthieu De Mari" userId="dfb708c9-d8dc-439f-9a3b-c772bf4a311c" providerId="ADAL" clId="{81E9B007-0C2C-493E-9B93-55A62C9C1F12}" dt="2026-01-09T02:04:59.043" v="659" actId="47"/>
-        <pc:sldMkLst>
-          <pc:docMk/>
-          <pc:sldMk cId="3605419039" sldId="586"/>
-        </pc:sldMkLst>
-      </pc:sldChg>
-      <pc:sldChg chg="del">
-        <pc:chgData name="Matthieu De Mari" userId="dfb708c9-d8dc-439f-9a3b-c772bf4a311c" providerId="ADAL" clId="{81E9B007-0C2C-493E-9B93-55A62C9C1F12}" dt="2026-01-09T02:05:00.869" v="660" actId="47"/>
-        <pc:sldMkLst>
-          <pc:docMk/>
-          <pc:sldMk cId="884021004" sldId="587"/>
-        </pc:sldMkLst>
-      </pc:sldChg>
-      <pc:sldChg chg="del">
-        <pc:chgData name="Matthieu De Mari" userId="dfb708c9-d8dc-439f-9a3b-c772bf4a311c" providerId="ADAL" clId="{81E9B007-0C2C-493E-9B93-55A62C9C1F12}" dt="2026-01-09T02:05:00.869" v="660" actId="47"/>
-        <pc:sldMkLst>
-          <pc:docMk/>
-          <pc:sldMk cId="2267076689" sldId="588"/>
-        </pc:sldMkLst>
-      </pc:sldChg>
       <pc:sldChg chg="modSp mod">
         <pc:chgData name="Matthieu De Mari" userId="dfb708c9-d8dc-439f-9a3b-c772bf4a311c" providerId="ADAL" clId="{81E9B007-0C2C-493E-9B93-55A62C9C1F12}" dt="2025-12-18T21:34:27.034" v="162" actId="20577"/>
         <pc:sldMkLst>
@@ -835,27 +604,6 @@
           </ac:spMkLst>
         </pc:spChg>
       </pc:sldChg>
-      <pc:sldChg chg="del">
-        <pc:chgData name="Matthieu De Mari" userId="dfb708c9-d8dc-439f-9a3b-c772bf4a311c" providerId="ADAL" clId="{81E9B007-0C2C-493E-9B93-55A62C9C1F12}" dt="2026-01-09T02:05:00.869" v="660" actId="47"/>
-        <pc:sldMkLst>
-          <pc:docMk/>
-          <pc:sldMk cId="3838573415" sldId="594"/>
-        </pc:sldMkLst>
-      </pc:sldChg>
-      <pc:sldChg chg="del">
-        <pc:chgData name="Matthieu De Mari" userId="dfb708c9-d8dc-439f-9a3b-c772bf4a311c" providerId="ADAL" clId="{81E9B007-0C2C-493E-9B93-55A62C9C1F12}" dt="2026-01-09T02:05:00.869" v="660" actId="47"/>
-        <pc:sldMkLst>
-          <pc:docMk/>
-          <pc:sldMk cId="1883251359" sldId="595"/>
-        </pc:sldMkLst>
-      </pc:sldChg>
-      <pc:sldChg chg="del">
-        <pc:chgData name="Matthieu De Mari" userId="dfb708c9-d8dc-439f-9a3b-c772bf4a311c" providerId="ADAL" clId="{81E9B007-0C2C-493E-9B93-55A62C9C1F12}" dt="2026-01-09T02:05:03.644" v="662" actId="47"/>
-        <pc:sldMkLst>
-          <pc:docMk/>
-          <pc:sldMk cId="3219688854" sldId="597"/>
-        </pc:sldMkLst>
-      </pc:sldChg>
       <pc:sldChg chg="add">
         <pc:chgData name="Matthieu De Mari" userId="dfb708c9-d8dc-439f-9a3b-c772bf4a311c" providerId="ADAL" clId="{81E9B007-0C2C-493E-9B93-55A62C9C1F12}" dt="2026-01-09T02:03:18.802" v="587"/>
         <pc:sldMkLst>
@@ -864,13 +612,13 @@
         </pc:sldMkLst>
       </pc:sldChg>
       <pc:sldChg chg="modSp add mod">
-        <pc:chgData name="Matthieu De Mari" userId="dfb708c9-d8dc-439f-9a3b-c772bf4a311c" providerId="ADAL" clId="{81E9B007-0C2C-493E-9B93-55A62C9C1F12}" dt="2026-01-09T02:03:53.822" v="654" actId="20577"/>
+        <pc:chgData name="Matthieu De Mari" userId="dfb708c9-d8dc-439f-9a3b-c772bf4a311c" providerId="ADAL" clId="{81E9B007-0C2C-493E-9B93-55A62C9C1F12}" dt="2026-01-12T06:25:18.942" v="665" actId="20577"/>
         <pc:sldMkLst>
           <pc:docMk/>
           <pc:sldMk cId="4272836236" sldId="599"/>
         </pc:sldMkLst>
         <pc:spChg chg="mod">
-          <ac:chgData name="Matthieu De Mari" userId="dfb708c9-d8dc-439f-9a3b-c772bf4a311c" providerId="ADAL" clId="{81E9B007-0C2C-493E-9B93-55A62C9C1F12}" dt="2026-01-09T02:03:53.822" v="654" actId="20577"/>
+          <ac:chgData name="Matthieu De Mari" userId="dfb708c9-d8dc-439f-9a3b-c772bf4a311c" providerId="ADAL" clId="{81E9B007-0C2C-493E-9B93-55A62C9C1F12}" dt="2026-01-12T06:25:18.942" v="665" actId="20577"/>
           <ac:spMkLst>
             <pc:docMk/>
             <pc:sldMk cId="4272836236" sldId="599"/>
@@ -965,7 +713,7 @@
           <a:p>
             <a:fld id="{61478373-EB31-4867-8CF0-FA31364748A5}" type="datetimeFigureOut">
               <a:rPr lang="en-GB" smtClean="0"/>
-              <a:t>09/01/2026</a:t>
+              <a:t>12/01/2026</a:t>
             </a:fld>
             <a:endParaRPr lang="en-GB"/>
           </a:p>
@@ -1382,7 +1130,7 @@
           <a:p>
             <a:fld id="{E85DF616-B21E-4EF6-A6A5-95E2FB3EB1A1}" type="datetimeFigureOut">
               <a:rPr lang="en-GB" smtClean="0"/>
-              <a:t>09/01/2026</a:t>
+              <a:t>12/01/2026</a:t>
             </a:fld>
             <a:endParaRPr lang="en-GB"/>
           </a:p>
@@ -1582,7 +1330,7 @@
           <a:p>
             <a:fld id="{E85DF616-B21E-4EF6-A6A5-95E2FB3EB1A1}" type="datetimeFigureOut">
               <a:rPr lang="en-GB" smtClean="0"/>
-              <a:t>09/01/2026</a:t>
+              <a:t>12/01/2026</a:t>
             </a:fld>
             <a:endParaRPr lang="en-GB"/>
           </a:p>
@@ -1792,7 +1540,7 @@
           <a:p>
             <a:fld id="{E85DF616-B21E-4EF6-A6A5-95E2FB3EB1A1}" type="datetimeFigureOut">
               <a:rPr lang="en-GB" smtClean="0"/>
-              <a:t>09/01/2026</a:t>
+              <a:t>12/01/2026</a:t>
             </a:fld>
             <a:endParaRPr lang="en-GB"/>
           </a:p>
@@ -1992,7 +1740,7 @@
           <a:p>
             <a:fld id="{E85DF616-B21E-4EF6-A6A5-95E2FB3EB1A1}" type="datetimeFigureOut">
               <a:rPr lang="en-GB" smtClean="0"/>
-              <a:t>09/01/2026</a:t>
+              <a:t>12/01/2026</a:t>
             </a:fld>
             <a:endParaRPr lang="en-GB"/>
           </a:p>
@@ -2268,7 +2016,7 @@
           <a:p>
             <a:fld id="{E85DF616-B21E-4EF6-A6A5-95E2FB3EB1A1}" type="datetimeFigureOut">
               <a:rPr lang="en-GB" smtClean="0"/>
-              <a:t>09/01/2026</a:t>
+              <a:t>12/01/2026</a:t>
             </a:fld>
             <a:endParaRPr lang="en-GB"/>
           </a:p>
@@ -2536,7 +2284,7 @@
           <a:p>
             <a:fld id="{E85DF616-B21E-4EF6-A6A5-95E2FB3EB1A1}" type="datetimeFigureOut">
               <a:rPr lang="en-GB" smtClean="0"/>
-              <a:t>09/01/2026</a:t>
+              <a:t>12/01/2026</a:t>
             </a:fld>
             <a:endParaRPr lang="en-GB"/>
           </a:p>
@@ -2951,7 +2699,7 @@
           <a:p>
             <a:fld id="{E85DF616-B21E-4EF6-A6A5-95E2FB3EB1A1}" type="datetimeFigureOut">
               <a:rPr lang="en-GB" smtClean="0"/>
-              <a:t>09/01/2026</a:t>
+              <a:t>12/01/2026</a:t>
             </a:fld>
             <a:endParaRPr lang="en-GB"/>
           </a:p>
@@ -3093,7 +2841,7 @@
           <a:p>
             <a:fld id="{E85DF616-B21E-4EF6-A6A5-95E2FB3EB1A1}" type="datetimeFigureOut">
               <a:rPr lang="en-GB" smtClean="0"/>
-              <a:t>09/01/2026</a:t>
+              <a:t>12/01/2026</a:t>
             </a:fld>
             <a:endParaRPr lang="en-GB"/>
           </a:p>
@@ -3206,7 +2954,7 @@
           <a:p>
             <a:fld id="{E85DF616-B21E-4EF6-A6A5-95E2FB3EB1A1}" type="datetimeFigureOut">
               <a:rPr lang="en-GB" smtClean="0"/>
-              <a:t>09/01/2026</a:t>
+              <a:t>12/01/2026</a:t>
             </a:fld>
             <a:endParaRPr lang="en-GB"/>
           </a:p>
@@ -3519,7 +3267,7 @@
           <a:p>
             <a:fld id="{E85DF616-B21E-4EF6-A6A5-95E2FB3EB1A1}" type="datetimeFigureOut">
               <a:rPr lang="en-GB" smtClean="0"/>
-              <a:t>09/01/2026</a:t>
+              <a:t>12/01/2026</a:t>
             </a:fld>
             <a:endParaRPr lang="en-GB"/>
           </a:p>
@@ -3808,7 +3556,7 @@
           <a:p>
             <a:fld id="{E85DF616-B21E-4EF6-A6A5-95E2FB3EB1A1}" type="datetimeFigureOut">
               <a:rPr lang="en-GB" smtClean="0"/>
-              <a:t>09/01/2026</a:t>
+              <a:t>12/01/2026</a:t>
             </a:fld>
             <a:endParaRPr lang="en-GB"/>
           </a:p>
@@ -4051,7 +3799,7 @@
           <a:p>
             <a:fld id="{E85DF616-B21E-4EF6-A6A5-95E2FB3EB1A1}" type="datetimeFigureOut">
               <a:rPr lang="en-GB" smtClean="0"/>
-              <a:t>09/01/2026</a:t>
+              <a:t>12/01/2026</a:t>
             </a:fld>
             <a:endParaRPr lang="en-GB"/>
           </a:p>
@@ -19162,11 +18910,15 @@
           <a:p>
             <a:r>
               <a:rPr lang="en-GB" dirty="0"/>
-              <a:t>We will continue on the next lecture with the training procedure for this Neural Network we just </a:t>
+              <a:t>We will </a:t>
             </a:r>
             <a:r>
               <a:rPr lang="en-GB"/>
-              <a:t>built.</a:t>
+              <a:t>continue the </a:t>
+            </a:r>
+            <a:r>
+              <a:rPr lang="en-GB" dirty="0"/>
+              <a:t>next lecture with the training procedure for this Neural Network we just built.</a:t>
             </a:r>
             <a:endParaRPr lang="en-GB" i="1" dirty="0"/>
           </a:p>

</xml_diff>